<commit_message>
Labo added to Linq JSon file added
</commit_message>
<xml_diff>
--- a/!Documents/CSharp-LINQ.pptx
+++ b/!Documents/CSharp-LINQ.pptx
@@ -250,7 +250,7 @@
           <a:p>
             <a:fld id="{0123E455-1A20-4F9D-AB8C-A6908B79F2B5}" type="datetimeFigureOut">
               <a:rPr lang="en-US" smtClean="0"/>
-              <a:t>9/25/2024</a:t>
+              <a:t>9/29/2024</a:t>
             </a:fld>
             <a:endParaRPr lang="en-US"/>
           </a:p>
@@ -664,7 +664,7 @@
           <a:p>
             <a:fld id="{A0E91A94-F19F-40CA-AA51-DB498FD38CEA}" type="datetimeFigureOut">
               <a:rPr lang="en-US" smtClean="0"/>
-              <a:t>9/25/2024</a:t>
+              <a:t>9/29/2024</a:t>
             </a:fld>
             <a:endParaRPr lang="en-US"/>
           </a:p>
@@ -862,7 +862,7 @@
           <a:p>
             <a:fld id="{A0E91A94-F19F-40CA-AA51-DB498FD38CEA}" type="datetimeFigureOut">
               <a:rPr lang="en-US" smtClean="0"/>
-              <a:t>9/25/2024</a:t>
+              <a:t>9/29/2024</a:t>
             </a:fld>
             <a:endParaRPr lang="en-US"/>
           </a:p>
@@ -1070,7 +1070,7 @@
           <a:p>
             <a:fld id="{A0E91A94-F19F-40CA-AA51-DB498FD38CEA}" type="datetimeFigureOut">
               <a:rPr lang="en-US" smtClean="0"/>
-              <a:t>9/25/2024</a:t>
+              <a:t>9/29/2024</a:t>
             </a:fld>
             <a:endParaRPr lang="en-US"/>
           </a:p>
@@ -1336,7 +1336,7 @@
           <a:p>
             <a:fld id="{A0E91A94-F19F-40CA-AA51-DB498FD38CEA}" type="datetimeFigureOut">
               <a:rPr lang="en-US" smtClean="0"/>
-              <a:t>9/25/2024</a:t>
+              <a:t>9/29/2024</a:t>
             </a:fld>
             <a:endParaRPr lang="en-US"/>
           </a:p>
@@ -1611,7 +1611,7 @@
           <a:p>
             <a:fld id="{A0E91A94-F19F-40CA-AA51-DB498FD38CEA}" type="datetimeFigureOut">
               <a:rPr lang="en-US" smtClean="0"/>
-              <a:t>9/25/2024</a:t>
+              <a:t>9/29/2024</a:t>
             </a:fld>
             <a:endParaRPr lang="en-US"/>
           </a:p>
@@ -1876,7 +1876,7 @@
           <a:p>
             <a:fld id="{A0E91A94-F19F-40CA-AA51-DB498FD38CEA}" type="datetimeFigureOut">
               <a:rPr lang="en-US" smtClean="0"/>
-              <a:t>9/25/2024</a:t>
+              <a:t>9/29/2024</a:t>
             </a:fld>
             <a:endParaRPr lang="en-US"/>
           </a:p>
@@ -2288,7 +2288,7 @@
           <a:p>
             <a:fld id="{A0E91A94-F19F-40CA-AA51-DB498FD38CEA}" type="datetimeFigureOut">
               <a:rPr lang="en-US" smtClean="0"/>
-              <a:t>9/25/2024</a:t>
+              <a:t>9/29/2024</a:t>
             </a:fld>
             <a:endParaRPr lang="en-US"/>
           </a:p>
@@ -2429,7 +2429,7 @@
           <a:p>
             <a:fld id="{A0E91A94-F19F-40CA-AA51-DB498FD38CEA}" type="datetimeFigureOut">
               <a:rPr lang="en-US" smtClean="0"/>
-              <a:t>9/25/2024</a:t>
+              <a:t>9/29/2024</a:t>
             </a:fld>
             <a:endParaRPr lang="en-US"/>
           </a:p>
@@ -2542,7 +2542,7 @@
           <a:p>
             <a:fld id="{A0E91A94-F19F-40CA-AA51-DB498FD38CEA}" type="datetimeFigureOut">
               <a:rPr lang="en-US" smtClean="0"/>
-              <a:t>9/25/2024</a:t>
+              <a:t>9/29/2024</a:t>
             </a:fld>
             <a:endParaRPr lang="en-US"/>
           </a:p>
@@ -2853,7 +2853,7 @@
           <a:p>
             <a:fld id="{A0E91A94-F19F-40CA-AA51-DB498FD38CEA}" type="datetimeFigureOut">
               <a:rPr lang="en-US" smtClean="0"/>
-              <a:t>9/25/2024</a:t>
+              <a:t>9/29/2024</a:t>
             </a:fld>
             <a:endParaRPr lang="en-US"/>
           </a:p>
@@ -3141,7 +3141,7 @@
           <a:p>
             <a:fld id="{A0E91A94-F19F-40CA-AA51-DB498FD38CEA}" type="datetimeFigureOut">
               <a:rPr lang="en-US" smtClean="0"/>
-              <a:t>9/25/2024</a:t>
+              <a:t>9/29/2024</a:t>
             </a:fld>
             <a:endParaRPr lang="en-US"/>
           </a:p>
@@ -3382,7 +3382,7 @@
           <a:p>
             <a:fld id="{A0E91A94-F19F-40CA-AA51-DB498FD38CEA}" type="datetimeFigureOut">
               <a:rPr lang="en-US" smtClean="0"/>
-              <a:t>9/25/2024</a:t>
+              <a:t>9/29/2024</a:t>
             </a:fld>
             <a:endParaRPr lang="en-US"/>
           </a:p>
@@ -34433,10 +34433,7 @@
     <p:bg>
       <p:bgPr>
         <a:solidFill>
-          <a:schemeClr val="bg1">
-            <a:tint val="95000"/>
-            <a:satMod val="170000"/>
-          </a:schemeClr>
+          <a:schemeClr val="bg1"/>
         </a:solidFill>
         <a:effectLst/>
       </p:bgPr>
@@ -34455,76 +34452,12 @@
           <a:chExt cx="0" cy="0"/>
         </a:xfrm>
       </p:grpSpPr>
-      <p:pic>
-        <p:nvPicPr>
-          <p:cNvPr id="4" name="Picture 3" descr="A person sitting on a bench reading a book shelf&#10;&#10;Description automatically generated">
+      <p:sp useBgFill="1">
+        <p:nvSpPr>
+          <p:cNvPr id="45" name="Rectangle 44">
             <a:extLst>
               <a:ext uri="{FF2B5EF4-FFF2-40B4-BE49-F238E27FC236}">
-                <a16:creationId xmlns:a16="http://schemas.microsoft.com/office/drawing/2014/main" id="{D6C8305F-5B1E-4D41-8577-2292AB1FBE3C}"/>
-              </a:ext>
-            </a:extLst>
-          </p:cNvPr>
-          <p:cNvPicPr>
-            <a:picLocks noChangeAspect="1"/>
-          </p:cNvPicPr>
-          <p:nvPr/>
-        </p:nvPicPr>
-        <p:blipFill rotWithShape="1">
-          <a:blip r:embed="rId2"/>
-          <a:srcRect t="2167" r="1" b="1"/>
-          <a:stretch/>
-        </p:blipFill>
-        <p:spPr>
-          <a:xfrm>
-            <a:off x="5182104" y="10"/>
-            <a:ext cx="7009896" cy="6857990"/>
-          </a:xfrm>
-          <a:custGeom>
-            <a:avLst/>
-            <a:gdLst/>
-            <a:ahLst/>
-            <a:cxnLst/>
-            <a:rect l="l" t="t" r="r" b="b"/>
-            <a:pathLst>
-              <a:path w="7009896" h="6858000">
-                <a:moveTo>
-                  <a:pt x="0" y="0"/>
-                </a:moveTo>
-                <a:lnTo>
-                  <a:pt x="7009896" y="0"/>
-                </a:lnTo>
-                <a:lnTo>
-                  <a:pt x="7009896" y="6858000"/>
-                </a:lnTo>
-                <a:lnTo>
-                  <a:pt x="21616" y="6858000"/>
-                </a:lnTo>
-                <a:lnTo>
-                  <a:pt x="129867" y="6647018"/>
-                </a:lnTo>
-                <a:cubicBezTo>
-                  <a:pt x="1043295" y="4758249"/>
-                  <a:pt x="1332296" y="2559611"/>
-                  <a:pt x="814641" y="380651"/>
-                </a:cubicBezTo>
-                <a:lnTo>
-                  <a:pt x="714685" y="1"/>
-                </a:lnTo>
-                <a:lnTo>
-                  <a:pt x="0" y="1"/>
-                </a:lnTo>
-                <a:close/>
-              </a:path>
-            </a:pathLst>
-          </a:custGeom>
-        </p:spPr>
-      </p:pic>
-      <p:sp>
-        <p:nvSpPr>
-          <p:cNvPr id="25" name="Freeform: Shape 13">
-            <a:extLst>
-              <a:ext uri="{FF2B5EF4-FFF2-40B4-BE49-F238E27FC236}">
-                <a16:creationId xmlns:a16="http://schemas.microsoft.com/office/drawing/2014/main" id="{5FDF4720-5445-47BE-89FE-E40D1AE6F619}"/>
+                <a16:creationId xmlns:a16="http://schemas.microsoft.com/office/drawing/2014/main" id="{96CF2A2B-0745-440C-9224-C5C6A0A4286F}"/>
               </a:ext>
               <a:ext uri="{C183D7F6-B498-43B3-948B-1728B52AA6E4}">
                 <adec:decorative xmlns:adec="http://schemas.microsoft.com/office/drawing/2017/decorative" val="1"/>
@@ -34545,76 +34478,102 @@
         <p:spPr>
           <a:xfrm>
             <a:off x="0" y="-1"/>
-            <a:ext cx="6480073" cy="6858002"/>
+            <a:ext cx="12188952" cy="6858000"/>
           </a:xfrm>
-          <a:custGeom>
+          <a:prstGeom prst="rect">
             <a:avLst/>
-            <a:gdLst>
-              <a:gd name="connsiteX0" fmla="*/ 6130244 w 6480073"/>
-              <a:gd name="connsiteY0" fmla="*/ 0 h 6858002"/>
-              <a:gd name="connsiteX1" fmla="*/ 6212951 w 6480073"/>
-              <a:gd name="connsiteY1" fmla="*/ 314584 h 6858002"/>
-              <a:gd name="connsiteX2" fmla="*/ 5540779 w 6480073"/>
-              <a:gd name="connsiteY2" fmla="*/ 6756649 h 6858002"/>
-              <a:gd name="connsiteX3" fmla="*/ 5489971 w 6480073"/>
-              <a:gd name="connsiteY3" fmla="*/ 6858002 h 6858002"/>
-              <a:gd name="connsiteX4" fmla="*/ 0 w 6480073"/>
-              <a:gd name="connsiteY4" fmla="*/ 6858002 h 6858002"/>
-              <a:gd name="connsiteX5" fmla="*/ 0 w 6480073"/>
-              <a:gd name="connsiteY5" fmla="*/ 0 h 6858002"/>
-            </a:gdLst>
-            <a:ahLst/>
-            <a:cxnLst>
-              <a:cxn ang="0">
-                <a:pos x="connsiteX0" y="connsiteY0"/>
-              </a:cxn>
-              <a:cxn ang="0">
-                <a:pos x="connsiteX1" y="connsiteY1"/>
-              </a:cxn>
-              <a:cxn ang="0">
-                <a:pos x="connsiteX2" y="connsiteY2"/>
-              </a:cxn>
-              <a:cxn ang="0">
-                <a:pos x="connsiteX3" y="connsiteY3"/>
-              </a:cxn>
-              <a:cxn ang="0">
-                <a:pos x="connsiteX4" y="connsiteY4"/>
-              </a:cxn>
-              <a:cxn ang="0">
-                <a:pos x="connsiteX5" y="connsiteY5"/>
-              </a:cxn>
-            </a:cxnLst>
-            <a:rect l="l" t="t" r="r" b="b"/>
-            <a:pathLst>
-              <a:path w="6480073" h="6858002">
-                <a:moveTo>
-                  <a:pt x="6130244" y="0"/>
-                </a:moveTo>
-                <a:lnTo>
-                  <a:pt x="6212951" y="314584"/>
-                </a:lnTo>
-                <a:cubicBezTo>
-                  <a:pt x="6745828" y="2551616"/>
-                  <a:pt x="6460994" y="4808873"/>
-                  <a:pt x="5540779" y="6756649"/>
-                </a:cubicBezTo>
-                <a:lnTo>
-                  <a:pt x="5489971" y="6858002"/>
-                </a:lnTo>
-                <a:lnTo>
-                  <a:pt x="0" y="6858002"/>
-                </a:lnTo>
-                <a:lnTo>
-                  <a:pt x="0" y="0"/>
-                </a:lnTo>
-                <a:close/>
-              </a:path>
-            </a:pathLst>
-          </a:custGeom>
+          </a:prstGeom>
+          <a:ln>
+            <a:noFill/>
+          </a:ln>
+        </p:spPr>
+        <p:style>
+          <a:lnRef idx="2">
+            <a:schemeClr val="accent1">
+              <a:shade val="50000"/>
+            </a:schemeClr>
+          </a:lnRef>
+          <a:fillRef idx="1">
+            <a:schemeClr val="accent1"/>
+          </a:fillRef>
+          <a:effectRef idx="0">
+            <a:schemeClr val="accent1"/>
+          </a:effectRef>
+          <a:fontRef idx="minor">
+            <a:schemeClr val="lt1"/>
+          </a:fontRef>
+        </p:style>
+        <p:txBody>
+          <a:bodyPr rtlCol="0" anchor="ctr"/>
+          <a:lstStyle/>
+          <a:p>
+            <a:pPr marL="0" marR="0" lvl="0" indent="0" algn="ctr" defTabSz="914400" rtl="0" eaLnBrk="1" fontAlgn="auto" latinLnBrk="0" hangingPunct="1">
+              <a:lnSpc>
+                <a:spcPct val="100000"/>
+              </a:lnSpc>
+              <a:spcBef>
+                <a:spcPts val="0"/>
+              </a:spcBef>
+              <a:spcAft>
+                <a:spcPts val="0"/>
+              </a:spcAft>
+              <a:buClrTx/>
+              <a:buSzTx/>
+              <a:buFontTx/>
+              <a:buNone/>
+              <a:tabLst/>
+              <a:defRPr/>
+            </a:pPr>
+            <a:endParaRPr kumimoji="0" lang="en-US" sz="1800" b="0" i="0" u="none" strike="noStrike" kern="1200" cap="none" spc="0" normalizeH="0" baseline="0" noProof="0">
+              <a:ln>
+                <a:noFill/>
+              </a:ln>
+              <a:solidFill>
+                <a:prstClr val="white"/>
+              </a:solidFill>
+              <a:effectLst/>
+              <a:uLnTx/>
+              <a:uFillTx/>
+              <a:latin typeface="Calibri" panose="020F0502020204030204"/>
+              <a:ea typeface="+mn-ea"/>
+              <a:cs typeface="+mn-cs"/>
+            </a:endParaRPr>
+          </a:p>
+        </p:txBody>
+      </p:sp>
+      <p:sp>
+        <p:nvSpPr>
+          <p:cNvPr id="47" name="Rectangle 46">
+            <a:extLst>
+              <a:ext uri="{FF2B5EF4-FFF2-40B4-BE49-F238E27FC236}">
+                <a16:creationId xmlns:a16="http://schemas.microsoft.com/office/drawing/2014/main" id="{75BE6D6B-84C9-4D2B-97EB-773B7369EF82}"/>
+              </a:ext>
+              <a:ext uri="{C183D7F6-B498-43B3-948B-1728B52AA6E4}">
+                <adec:decorative xmlns:adec="http://schemas.microsoft.com/office/drawing/2017/decorative" val="1"/>
+              </a:ext>
+            </a:extLst>
+          </p:cNvPr>
+          <p:cNvSpPr>
+            <a:spLocks noGrp="1" noRot="1" noChangeAspect="1" noMove="1" noResize="1" noEditPoints="1" noAdjustHandles="1" noChangeArrowheads="1" noChangeShapeType="1" noTextEdit="1"/>
+          </p:cNvSpPr>
+          <p:nvPr>
+            <p:extLst>
+              <p:ext uri="{386F3935-93C4-4BCD-93E2-E3B085C9AB24}">
+                <p16:designElem xmlns:p16="http://schemas.microsoft.com/office/powerpoint/2015/main" val="1"/>
+              </p:ext>
+            </p:extLst>
+          </p:nvPr>
+        </p:nvSpPr>
+        <p:spPr>
+          <a:xfrm>
+            <a:off x="0" y="0"/>
+            <a:ext cx="12192000" cy="6858000"/>
+          </a:xfrm>
+          <a:prstGeom prst="rect">
+            <a:avLst/>
+          </a:prstGeom>
           <a:solidFill>
-            <a:schemeClr val="tx1">
-              <a:alpha val="80000"/>
-            </a:schemeClr>
+            <a:srgbClr val="000000"/>
           </a:solidFill>
           <a:ln>
             <a:noFill/>
@@ -34637,139 +34596,79 @@
           </a:fontRef>
         </p:style>
         <p:txBody>
-          <a:bodyPr wrap="square" rtlCol="0" anchor="ctr">
-            <a:noAutofit/>
-          </a:bodyPr>
+          <a:bodyPr rtlCol="0" anchor="ctr"/>
           <a:lstStyle/>
           <a:p>
-            <a:pPr algn="ctr"/>
-            <a:endParaRPr lang="en-US"/>
+            <a:pPr marL="0" marR="0" lvl="0" indent="0" algn="ctr" defTabSz="914400" rtl="0" eaLnBrk="1" fontAlgn="auto" latinLnBrk="0" hangingPunct="1">
+              <a:lnSpc>
+                <a:spcPct val="100000"/>
+              </a:lnSpc>
+              <a:spcBef>
+                <a:spcPts val="0"/>
+              </a:spcBef>
+              <a:spcAft>
+                <a:spcPts val="0"/>
+              </a:spcAft>
+              <a:buClrTx/>
+              <a:buSzTx/>
+              <a:buFontTx/>
+              <a:buNone/>
+              <a:tabLst/>
+              <a:defRPr/>
+            </a:pPr>
+            <a:endParaRPr kumimoji="0" lang="en-US" sz="1800" b="0" i="0" u="none" strike="noStrike" kern="1200" cap="none" spc="0" normalizeH="0" baseline="0" noProof="0">
+              <a:ln>
+                <a:noFill/>
+              </a:ln>
+              <a:solidFill>
+                <a:srgbClr val="000000"/>
+              </a:solidFill>
+              <a:effectLst/>
+              <a:uLnTx/>
+              <a:uFillTx/>
+              <a:latin typeface="Calibri" panose="020F0502020204030204"/>
+              <a:ea typeface="+mn-ea"/>
+              <a:cs typeface="+mn-cs"/>
+            </a:endParaRPr>
           </a:p>
         </p:txBody>
       </p:sp>
-      <p:sp useBgFill="1">
-        <p:nvSpPr>
-          <p:cNvPr id="26" name="Freeform: Shape 15">
+      <p:pic>
+        <p:nvPicPr>
+          <p:cNvPr id="4" name="Picture 3">
             <a:extLst>
               <a:ext uri="{FF2B5EF4-FFF2-40B4-BE49-F238E27FC236}">
-                <a16:creationId xmlns:a16="http://schemas.microsoft.com/office/drawing/2014/main" id="{AC8710B4-A815-4082-9E4F-F13A0007090C}"/>
-              </a:ext>
-              <a:ext uri="{C183D7F6-B498-43B3-948B-1728B52AA6E4}">
-                <adec:decorative xmlns:adec="http://schemas.microsoft.com/office/drawing/2017/decorative" val="1"/>
+                <a16:creationId xmlns:a16="http://schemas.microsoft.com/office/drawing/2014/main" id="{D6C8305F-5B1E-4D41-8577-2292AB1FBE3C}"/>
               </a:ext>
             </a:extLst>
           </p:cNvPr>
-          <p:cNvSpPr>
-            <a:spLocks noGrp="1" noRot="1" noChangeAspect="1" noMove="1" noResize="1" noEditPoints="1" noAdjustHandles="1" noChangeArrowheads="1" noChangeShapeType="1" noTextEdit="1"/>
-          </p:cNvSpPr>
-          <p:nvPr>
-            <p:extLst>
-              <p:ext uri="{386F3935-93C4-4BCD-93E2-E3B085C9AB24}">
-                <p16:designElem xmlns:p16="http://schemas.microsoft.com/office/powerpoint/2015/main" val="1"/>
-              </p:ext>
-            </p:extLst>
-          </p:nvPr>
-        </p:nvSpPr>
+          <p:cNvPicPr>
+            <a:picLocks noChangeAspect="1"/>
+          </p:cNvPicPr>
+          <p:nvPr/>
+        </p:nvPicPr>
+        <p:blipFill>
+          <a:blip r:embed="rId2">
+            <a:alphaModFix amt="60000"/>
+            <a:extLst>
+              <a:ext uri="{28A0092B-C50C-407E-A947-70E740481C1C}">
+                <a14:useLocalDpi xmlns:a14="http://schemas.microsoft.com/office/drawing/2010/main" val="0"/>
+              </a:ext>
+            </a:extLst>
+          </a:blip>
+          <a:srcRect t="9721" b="16021"/>
+          <a:stretch/>
+        </p:blipFill>
         <p:spPr>
           <a:xfrm>
-            <a:off x="0" y="0"/>
-            <a:ext cx="6249216" cy="6858001"/>
+            <a:off x="-1" y="10"/>
+            <a:ext cx="12192001" cy="6857990"/>
           </a:xfrm>
-          <a:custGeom>
+          <a:prstGeom prst="rect">
             <a:avLst/>
-            <a:gdLst>
-              <a:gd name="connsiteX0" fmla="*/ 0 w 6249216"/>
-              <a:gd name="connsiteY0" fmla="*/ 0 h 6858001"/>
-              <a:gd name="connsiteX1" fmla="*/ 5893742 w 6249216"/>
-              <a:gd name="connsiteY1" fmla="*/ 1 h 6858001"/>
-              <a:gd name="connsiteX2" fmla="*/ 5993697 w 6249216"/>
-              <a:gd name="connsiteY2" fmla="*/ 380651 h 6858001"/>
-              <a:gd name="connsiteX3" fmla="*/ 5308924 w 6249216"/>
-              <a:gd name="connsiteY3" fmla="*/ 6647018 h 6858001"/>
-              <a:gd name="connsiteX4" fmla="*/ 5200672 w 6249216"/>
-              <a:gd name="connsiteY4" fmla="*/ 6858001 h 6858001"/>
-              <a:gd name="connsiteX5" fmla="*/ 1 w 6249216"/>
-              <a:gd name="connsiteY5" fmla="*/ 6858001 h 6858001"/>
-            </a:gdLst>
-            <a:ahLst/>
-            <a:cxnLst>
-              <a:cxn ang="0">
-                <a:pos x="connsiteX0" y="connsiteY0"/>
-              </a:cxn>
-              <a:cxn ang="0">
-                <a:pos x="connsiteX1" y="connsiteY1"/>
-              </a:cxn>
-              <a:cxn ang="0">
-                <a:pos x="connsiteX2" y="connsiteY2"/>
-              </a:cxn>
-              <a:cxn ang="0">
-                <a:pos x="connsiteX3" y="connsiteY3"/>
-              </a:cxn>
-              <a:cxn ang="0">
-                <a:pos x="connsiteX4" y="connsiteY4"/>
-              </a:cxn>
-              <a:cxn ang="0">
-                <a:pos x="connsiteX5" y="connsiteY5"/>
-              </a:cxn>
-            </a:cxnLst>
-            <a:rect l="l" t="t" r="r" b="b"/>
-            <a:pathLst>
-              <a:path w="6249216" h="6858001">
-                <a:moveTo>
-                  <a:pt x="0" y="0"/>
-                </a:moveTo>
-                <a:lnTo>
-                  <a:pt x="5893742" y="1"/>
-                </a:lnTo>
-                <a:lnTo>
-                  <a:pt x="5993697" y="380651"/>
-                </a:lnTo>
-                <a:cubicBezTo>
-                  <a:pt x="6511353" y="2559611"/>
-                  <a:pt x="6222352" y="4758249"/>
-                  <a:pt x="5308924" y="6647018"/>
-                </a:cubicBezTo>
-                <a:lnTo>
-                  <a:pt x="5200672" y="6858001"/>
-                </a:lnTo>
-                <a:lnTo>
-                  <a:pt x="1" y="6858001"/>
-                </a:lnTo>
-                <a:close/>
-              </a:path>
-            </a:pathLst>
-          </a:custGeom>
-          <a:ln>
-            <a:noFill/>
-          </a:ln>
+          </a:prstGeom>
         </p:spPr>
-        <p:style>
-          <a:lnRef idx="2">
-            <a:schemeClr val="accent1">
-              <a:shade val="50000"/>
-            </a:schemeClr>
-          </a:lnRef>
-          <a:fillRef idx="1">
-            <a:schemeClr val="accent1"/>
-          </a:fillRef>
-          <a:effectRef idx="0">
-            <a:schemeClr val="accent1"/>
-          </a:effectRef>
-          <a:fontRef idx="minor">
-            <a:schemeClr val="lt1"/>
-          </a:fontRef>
-        </p:style>
-        <p:txBody>
-          <a:bodyPr wrap="square" rtlCol="0" anchor="ctr">
-            <a:noAutofit/>
-          </a:bodyPr>
-          <a:lstStyle/>
-          <a:p>
-            <a:pPr algn="ctr"/>
-            <a:endParaRPr lang="en-US"/>
-          </a:p>
-        </p:txBody>
-      </p:sp>
+      </p:pic>
       <p:sp>
         <p:nvSpPr>
           <p:cNvPr id="2" name="Titel 1">
@@ -34788,8 +34687,8 @@
         </p:nvSpPr>
         <p:spPr>
           <a:xfrm>
-            <a:off x="199823" y="228970"/>
-            <a:ext cx="4782458" cy="1325563"/>
+            <a:off x="1198181" y="728906"/>
+            <a:ext cx="9792471" cy="2057037"/>
           </a:xfrm>
         </p:spPr>
         <p:txBody>
@@ -34799,7 +34698,11 @@
           <a:lstStyle/>
           <a:p>
             <a:r>
-              <a:rPr lang="nl-BE" dirty="0"/>
+              <a:rPr lang="nl-BE">
+                <a:solidFill>
+                  <a:srgbClr val="FFFFFF"/>
+                </a:solidFill>
+              </a:rPr>
               <a:t>Labo</a:t>
             </a:r>
           </a:p>
@@ -34823,17 +34726,93 @@
         </p:nvSpPr>
         <p:spPr>
           <a:xfrm>
-            <a:off x="199823" y="1303506"/>
-            <a:ext cx="5387307" cy="4750160"/>
+            <a:off x="1198181" y="2957665"/>
+            <a:ext cx="9792471" cy="3171423"/>
           </a:xfrm>
         </p:spPr>
         <p:txBody>
-          <a:bodyPr anchor="t">
+          <a:bodyPr>
             <a:normAutofit/>
           </a:bodyPr>
           <a:lstStyle/>
           <a:p>
-            <a:endParaRPr lang="nl-BE" sz="1600" dirty="0"/>
+            <a:r>
+              <a:rPr lang="nl-BE" sz="2000">
+                <a:solidFill>
+                  <a:srgbClr val="FFFFFF"/>
+                </a:solidFill>
+              </a:rPr>
+              <a:t>Maak een GUI waarin je via filters luchthavens kan opzoeken.</a:t>
+            </a:r>
+          </a:p>
+          <a:p>
+            <a:pPr lvl="1"/>
+            <a:r>
+              <a:rPr lang="nl-BE" sz="2000">
+                <a:solidFill>
+                  <a:srgbClr val="FFFFFF"/>
+                </a:solidFill>
+              </a:rPr>
+              <a:t>De luchthavens kunnen gevonden worden op naam, locatie of id, ook als er maar een gedeelte van de naam of Id wordt opgegeven.</a:t>
+            </a:r>
+          </a:p>
+          <a:p>
+            <a:pPr lvl="1"/>
+            <a:r>
+              <a:rPr lang="nl-BE" sz="2000">
+                <a:solidFill>
+                  <a:srgbClr val="FFFFFF"/>
+                </a:solidFill>
+              </a:rPr>
+              <a:t>De locatie kan ook opgevraagd worden in een bepaalde range</a:t>
+            </a:r>
+          </a:p>
+          <a:p>
+            <a:pPr lvl="1"/>
+            <a:r>
+              <a:rPr lang="nl-BE" sz="2000">
+                <a:solidFill>
+                  <a:srgbClr val="FFFFFF"/>
+                </a:solidFill>
+              </a:rPr>
+              <a:t>Het is mogelijk om de luchthavens ook te sorteren op deze criteria</a:t>
+            </a:r>
+          </a:p>
+          <a:p>
+            <a:pPr lvl="1"/>
+            <a:endParaRPr lang="nl-BE" sz="2000">
+              <a:solidFill>
+                <a:srgbClr val="FFFFFF"/>
+              </a:solidFill>
+            </a:endParaRPr>
+          </a:p>
+          <a:p>
+            <a:r>
+              <a:rPr lang="nl-BE" sz="2000">
+                <a:solidFill>
+                  <a:srgbClr val="FFFFFF"/>
+                </a:solidFill>
+              </a:rPr>
+              <a:t>Een lijst van luchthavens kan gevonden worden in de solution en is in het Json formaat</a:t>
+            </a:r>
+          </a:p>
+          <a:p>
+            <a:pPr lvl="1"/>
+            <a:r>
+              <a:rPr lang="nl-BE" sz="2000">
+                <a:solidFill>
+                  <a:srgbClr val="FFFFFF"/>
+                </a:solidFill>
+              </a:rPr>
+              <a:t>Importeer deze file in een lijst van luchthavens waar je de bewerkingen kan op uitvoeren.</a:t>
+            </a:r>
+          </a:p>
+          <a:p>
+            <a:endParaRPr lang="nl-BE" sz="2000">
+              <a:solidFill>
+                <a:srgbClr val="FFFFFF"/>
+              </a:solidFill>
+            </a:endParaRPr>
           </a:p>
         </p:txBody>
       </p:sp>
@@ -34845,7 +34824,7 @@
     </p:extLst>
   </p:cSld>
   <p:clrMapOvr>
-    <a:overrideClrMapping bg1="dk1" tx1="lt1" bg2="dk2" tx2="lt2" accent1="accent1" accent2="accent2" accent3="accent3" accent4="accent4" accent5="accent5" accent6="accent6" hlink="hlink" folHlink="folHlink"/>
+    <a:masterClrMapping/>
   </p:clrMapOvr>
 </p:sld>
 </file>

</xml_diff>